<commit_message>
add Decoder test cases
</commit_message>
<xml_diff>
--- a/Project_Proposal.pptx
+++ b/Project_Proposal.pptx
@@ -5,10 +5,10 @@
     <p:sldMasterId id="2147483660" r:id="rId1"/>
   </p:sldMasterIdLst>
   <p:notesMasterIdLst>
-    <p:notesMasterId r:id="rId20"/>
+    <p:notesMasterId r:id="rId22"/>
   </p:notesMasterIdLst>
   <p:handoutMasterIdLst>
-    <p:handoutMasterId r:id="rId21"/>
+    <p:handoutMasterId r:id="rId23"/>
   </p:handoutMasterIdLst>
   <p:sldIdLst>
     <p:sldId id="256" r:id="rId2"/>
@@ -20,15 +20,17 @@
     <p:sldId id="327" r:id="rId8"/>
     <p:sldId id="328" r:id="rId9"/>
     <p:sldId id="340" r:id="rId10"/>
-    <p:sldId id="329" r:id="rId11"/>
-    <p:sldId id="341" r:id="rId12"/>
-    <p:sldId id="342" r:id="rId13"/>
-    <p:sldId id="330" r:id="rId14"/>
-    <p:sldId id="332" r:id="rId15"/>
-    <p:sldId id="339" r:id="rId16"/>
-    <p:sldId id="333" r:id="rId17"/>
-    <p:sldId id="335" r:id="rId18"/>
-    <p:sldId id="336" r:id="rId19"/>
+    <p:sldId id="317" r:id="rId11"/>
+    <p:sldId id="318" r:id="rId12"/>
+    <p:sldId id="329" r:id="rId13"/>
+    <p:sldId id="341" r:id="rId14"/>
+    <p:sldId id="342" r:id="rId15"/>
+    <p:sldId id="330" r:id="rId16"/>
+    <p:sldId id="332" r:id="rId17"/>
+    <p:sldId id="339" r:id="rId18"/>
+    <p:sldId id="333" r:id="rId19"/>
+    <p:sldId id="335" r:id="rId20"/>
+    <p:sldId id="336" r:id="rId21"/>
   </p:sldIdLst>
   <p:sldSz cx="12192000" cy="6858000"/>
   <p:notesSz cx="6858000" cy="9144000"/>
@@ -141,6 +143,8 @@
             <p14:sldId id="327"/>
             <p14:sldId id="328"/>
             <p14:sldId id="340"/>
+            <p14:sldId id="317"/>
+            <p14:sldId id="318"/>
             <p14:sldId id="329"/>
             <p14:sldId id="341"/>
             <p14:sldId id="342"/>
@@ -5354,7 +5358,7 @@
           <p:cNvPr id="2" name="Title 1">
             <a:extLst>
               <a:ext uri="{FF2B5EF4-FFF2-40B4-BE49-F238E27FC236}">
-                <a16:creationId xmlns:a16="http://schemas.microsoft.com/office/drawing/2014/main" id="{6346E85E-8D15-D4EB-CF18-9132EC62AC77}"/>
+                <a16:creationId xmlns:a16="http://schemas.microsoft.com/office/drawing/2014/main" id="{94017501-FF69-B9D4-5967-17557E053B3E}"/>
               </a:ext>
             </a:extLst>
           </p:cNvPr>
@@ -5377,58 +5381,182 @@
           <a:p>
             <a:r>
               <a:rPr lang="en-US" dirty="0"/>
-              <a:t>ALU</a:t>
-            </a:r>
-          </a:p>
-        </p:txBody>
-      </p:sp>
-      <p:sp>
-        <p:nvSpPr>
-          <p:cNvPr id="3" name="Subtitle 2">
-            <a:extLst>
-              <a:ext uri="{FF2B5EF4-FFF2-40B4-BE49-F238E27FC236}">
-                <a16:creationId xmlns:a16="http://schemas.microsoft.com/office/drawing/2014/main" id="{5B40D6B8-97AE-9397-3D32-EF0CF1737FFA}"/>
-              </a:ext>
-            </a:extLst>
-          </p:cNvPr>
-          <p:cNvSpPr>
-            <a:spLocks noGrp="1"/>
-          </p:cNvSpPr>
-          <p:nvPr>
-            <p:ph type="subTitle" idx="1"/>
+              <a:t>Test Cases</a:t>
+            </a:r>
+          </a:p>
+        </p:txBody>
+      </p:sp>
+      <p:sp>
+        <p:nvSpPr>
+          <p:cNvPr id="4" name="Text Placeholder 3">
+            <a:extLst>
+              <a:ext uri="{FF2B5EF4-FFF2-40B4-BE49-F238E27FC236}">
+                <a16:creationId xmlns:a16="http://schemas.microsoft.com/office/drawing/2014/main" id="{95D25B56-65F2-187D-9279-300460481F1F}"/>
+              </a:ext>
+            </a:extLst>
+          </p:cNvPr>
+          <p:cNvSpPr>
+            <a:spLocks noGrp="1"/>
+          </p:cNvSpPr>
+          <p:nvPr>
+            <p:ph type="body" sz="quarter" idx="14"/>
           </p:nvPr>
         </p:nvSpPr>
         <p:spPr/>
         <p:txBody>
-          <a:bodyPr/>
+          <a:bodyPr>
+            <a:normAutofit lnSpcReduction="10000"/>
+          </a:bodyPr>
           <a:lstStyle/>
           <a:p>
-            <a:endParaRPr lang="en-US"/>
-          </a:p>
-        </p:txBody>
-      </p:sp>
-      <p:sp>
-        <p:nvSpPr>
-          <p:cNvPr id="4" name="Text Placeholder 3">
-            <a:extLst>
-              <a:ext uri="{FF2B5EF4-FFF2-40B4-BE49-F238E27FC236}">
-                <a16:creationId xmlns:a16="http://schemas.microsoft.com/office/drawing/2014/main" id="{D9B79D28-048B-F636-E90A-160DCFE6618C}"/>
-              </a:ext>
-            </a:extLst>
-          </p:cNvPr>
-          <p:cNvSpPr>
-            <a:spLocks noGrp="1"/>
-          </p:cNvSpPr>
-          <p:nvPr>
-            <p:ph type="body" sz="quarter" idx="14"/>
-          </p:nvPr>
-        </p:nvSpPr>
-        <p:spPr/>
-        <p:txBody>
-          <a:bodyPr/>
-          <a:lstStyle/>
-          <a:p>
-            <a:endParaRPr lang="en-US"/>
+            <a:pPr marL="0" marR="0" indent="0">
+              <a:lnSpc>
+                <a:spcPct val="107000"/>
+              </a:lnSpc>
+              <a:spcBef>
+                <a:spcPts val="0"/>
+              </a:spcBef>
+              <a:spcAft>
+                <a:spcPts val="800"/>
+              </a:spcAft>
+              <a:buNone/>
+            </a:pPr>
+            <a:r>
+              <a:rPr lang="en-US" sz="2400" kern="100" dirty="0">
+                <a:effectLst/>
+                <a:latin typeface="Acumin Pro Semibold" panose="020B0504020202020204"/>
+                <a:ea typeface="Aptos" panose="020B0004020202020204" pitchFamily="34" charset="0"/>
+                <a:cs typeface="Times New Roman" panose="02020603050405020304" pitchFamily="18" charset="0"/>
+              </a:rPr>
+              <a:t>Control Unit Test Cases</a:t>
+            </a:r>
+          </a:p>
+          <a:p>
+            <a:pPr marL="342900" marR="0" lvl="0" indent="-342900">
+              <a:lnSpc>
+                <a:spcPct val="107000"/>
+              </a:lnSpc>
+              <a:spcBef>
+                <a:spcPts val="0"/>
+              </a:spcBef>
+              <a:spcAft>
+                <a:spcPts val="0"/>
+              </a:spcAft>
+              <a:buFont typeface="Symbol" panose="05050102010706020507" pitchFamily="18" charset="2"/>
+              <a:buChar char=""/>
+            </a:pPr>
+            <a:r>
+              <a:rPr lang="en-US" sz="2400" kern="100" dirty="0">
+                <a:effectLst/>
+                <a:latin typeface="Acumin Pro Semibold" panose="020B0504020202020204"/>
+                <a:ea typeface="Aptos" panose="020B0004020202020204" pitchFamily="34" charset="0"/>
+                <a:cs typeface="Times New Roman" panose="02020603050405020304" pitchFamily="18" charset="0"/>
+              </a:rPr>
+              <a:t>Input all valid Opcodes, validate control signal outputs</a:t>
+            </a:r>
+          </a:p>
+          <a:p>
+            <a:pPr marL="342900" marR="0" lvl="0" indent="-342900">
+              <a:lnSpc>
+                <a:spcPct val="107000"/>
+              </a:lnSpc>
+              <a:spcBef>
+                <a:spcPts val="0"/>
+              </a:spcBef>
+              <a:spcAft>
+                <a:spcPts val="800"/>
+              </a:spcAft>
+              <a:buFont typeface="Symbol" panose="05050102010706020507" pitchFamily="18" charset="2"/>
+              <a:buChar char=""/>
+            </a:pPr>
+            <a:r>
+              <a:rPr lang="en-US" sz="2400" kern="100" dirty="0">
+                <a:effectLst/>
+                <a:latin typeface="Acumin Pro Semibold" panose="020B0504020202020204"/>
+                <a:ea typeface="Aptos" panose="020B0004020202020204" pitchFamily="34" charset="0"/>
+                <a:cs typeface="Times New Roman" panose="02020603050405020304" pitchFamily="18" charset="0"/>
+              </a:rPr>
+              <a:t>Input invalid Opcode, check for error</a:t>
+            </a:r>
+          </a:p>
+          <a:p>
+            <a:pPr marL="0" marR="0" indent="0">
+              <a:lnSpc>
+                <a:spcPct val="107000"/>
+              </a:lnSpc>
+              <a:spcBef>
+                <a:spcPts val="0"/>
+              </a:spcBef>
+              <a:spcAft>
+                <a:spcPts val="800"/>
+              </a:spcAft>
+              <a:buNone/>
+            </a:pPr>
+            <a:r>
+              <a:rPr lang="en-US" sz="2400" kern="100" dirty="0">
+                <a:effectLst/>
+                <a:latin typeface="Acumin Pro Semibold" panose="020B0504020202020204"/>
+                <a:ea typeface="Aptos" panose="020B0004020202020204" pitchFamily="34" charset="0"/>
+                <a:cs typeface="Times New Roman" panose="02020603050405020304" pitchFamily="18" charset="0"/>
+              </a:rPr>
+              <a:t>Decoder Test Cases</a:t>
+            </a:r>
+          </a:p>
+          <a:p>
+            <a:pPr marL="342900" marR="0" lvl="0" indent="-342900">
+              <a:lnSpc>
+                <a:spcPct val="107000"/>
+              </a:lnSpc>
+              <a:spcBef>
+                <a:spcPts val="0"/>
+              </a:spcBef>
+              <a:spcAft>
+                <a:spcPts val="0"/>
+              </a:spcAft>
+              <a:buFont typeface="Symbol" panose="05050102010706020507" pitchFamily="18" charset="2"/>
+              <a:buChar char=""/>
+            </a:pPr>
+            <a:r>
+              <a:rPr lang="en-US" sz="2400" kern="100" dirty="0">
+                <a:effectLst/>
+                <a:latin typeface="Acumin Pro Semibold" panose="020B0504020202020204"/>
+                <a:ea typeface="Aptos" panose="020B0004020202020204" pitchFamily="34" charset="0"/>
+                <a:cs typeface="Times New Roman" panose="02020603050405020304" pitchFamily="18" charset="0"/>
+              </a:rPr>
+              <a:t>Input all instruction types with register addressees, validate correct addresses</a:t>
+            </a:r>
+          </a:p>
+          <a:p>
+            <a:pPr marL="342900" marR="0" lvl="0" indent="-342900">
+              <a:lnSpc>
+                <a:spcPct val="107000"/>
+              </a:lnSpc>
+              <a:spcBef>
+                <a:spcPts val="0"/>
+              </a:spcBef>
+              <a:spcAft>
+                <a:spcPts val="800"/>
+              </a:spcAft>
+              <a:buFont typeface="Symbol" panose="05050102010706020507" pitchFamily="18" charset="2"/>
+              <a:buChar char=""/>
+            </a:pPr>
+            <a:r>
+              <a:rPr lang="en-US" sz="2400" kern="100" dirty="0">
+                <a:effectLst/>
+                <a:latin typeface="Acumin Pro Semibold" panose="020B0504020202020204"/>
+                <a:ea typeface="Aptos" panose="020B0004020202020204" pitchFamily="34" charset="0"/>
+                <a:cs typeface="Times New Roman" panose="02020603050405020304" pitchFamily="18" charset="0"/>
+              </a:rPr>
+              <a:t>Input instruction without register address, check for garbage output</a:t>
+            </a:r>
+          </a:p>
+          <a:p>
+            <a:pPr marL="0" indent="0">
+              <a:buNone/>
+            </a:pPr>
+            <a:endParaRPr lang="en-US" sz="2400" dirty="0">
+              <a:latin typeface="Acumin Pro Semibold" panose="020B0504020202020204"/>
+            </a:endParaRPr>
           </a:p>
         </p:txBody>
       </p:sp>
@@ -5437,7 +5565,7 @@
           <p:cNvPr id="5" name="Slide Number Placeholder 4">
             <a:extLst>
               <a:ext uri="{FF2B5EF4-FFF2-40B4-BE49-F238E27FC236}">
-                <a16:creationId xmlns:a16="http://schemas.microsoft.com/office/drawing/2014/main" id="{9BCE14E6-F19C-7BB3-E487-D0FA7CFF54C1}"/>
+                <a16:creationId xmlns:a16="http://schemas.microsoft.com/office/drawing/2014/main" id="{12872916-28AA-76C1-E5AB-2D3481E9DDD8}"/>
               </a:ext>
             </a:extLst>
           </p:cNvPr>
@@ -5464,7 +5592,7 @@
     </p:spTree>
     <p:extLst>
       <p:ext uri="{BB962C8B-B14F-4D97-AF65-F5344CB8AC3E}">
-        <p14:creationId xmlns:p14="http://schemas.microsoft.com/office/powerpoint/2010/main" val="176491562"/>
+        <p14:creationId xmlns:p14="http://schemas.microsoft.com/office/powerpoint/2010/main" val="2827948853"/>
       </p:ext>
     </p:extLst>
   </p:cSld>
@@ -5496,7 +5624,7 @@
           <p:cNvPr id="2" name="Title 1">
             <a:extLst>
               <a:ext uri="{FF2B5EF4-FFF2-40B4-BE49-F238E27FC236}">
-                <a16:creationId xmlns:a16="http://schemas.microsoft.com/office/drawing/2014/main" id="{F15788A1-2A90-075C-0FD5-97BF4276DB6C}"/>
+                <a16:creationId xmlns:a16="http://schemas.microsoft.com/office/drawing/2014/main" id="{94017501-FF69-B9D4-5967-17557E053B3E}"/>
               </a:ext>
             </a:extLst>
           </p:cNvPr>
@@ -5519,41 +5647,115 @@
           <a:p>
             <a:r>
               <a:rPr lang="en-US" dirty="0"/>
-              <a:t>Registers</a:t>
-            </a:r>
-          </a:p>
-        </p:txBody>
-      </p:sp>
-      <p:sp>
-        <p:nvSpPr>
-          <p:cNvPr id="3" name="Subtitle 2">
-            <a:extLst>
-              <a:ext uri="{FF2B5EF4-FFF2-40B4-BE49-F238E27FC236}">
-                <a16:creationId xmlns:a16="http://schemas.microsoft.com/office/drawing/2014/main" id="{13643ECA-8A7C-9241-6882-E71BD1F12C44}"/>
-              </a:ext>
-            </a:extLst>
-          </p:cNvPr>
-          <p:cNvSpPr>
-            <a:spLocks noGrp="1"/>
-          </p:cNvSpPr>
-          <p:nvPr>
-            <p:ph type="subTitle" idx="1"/>
+              <a:t>Test Case</a:t>
+            </a:r>
+          </a:p>
+        </p:txBody>
+      </p:sp>
+      <p:sp>
+        <p:nvSpPr>
+          <p:cNvPr id="4" name="Text Placeholder 3">
+            <a:extLst>
+              <a:ext uri="{FF2B5EF4-FFF2-40B4-BE49-F238E27FC236}">
+                <a16:creationId xmlns:a16="http://schemas.microsoft.com/office/drawing/2014/main" id="{95D25B56-65F2-187D-9279-300460481F1F}"/>
+              </a:ext>
+            </a:extLst>
+          </p:cNvPr>
+          <p:cNvSpPr>
+            <a:spLocks noGrp="1"/>
+          </p:cNvSpPr>
+          <p:nvPr>
+            <p:ph type="body" sz="quarter" idx="14"/>
           </p:nvPr>
         </p:nvSpPr>
         <p:spPr/>
         <p:txBody>
-          <a:bodyPr/>
+          <a:bodyPr>
+            <a:normAutofit/>
+          </a:bodyPr>
           <a:lstStyle/>
           <a:p>
-            <a:r>
-              <a:rPr lang="en-US" dirty="0"/>
-              <a:t>Register RTL and </a:t>
-            </a:r>
-            <a:r>
-              <a:rPr lang="en-US" dirty="0" err="1"/>
-              <a:t>Psuedocode</a:t>
-            </a:r>
-            <a:endParaRPr lang="en-US" dirty="0"/>
+            <a:pPr marL="0" marR="0" indent="0">
+              <a:lnSpc>
+                <a:spcPct val="107000"/>
+              </a:lnSpc>
+              <a:spcBef>
+                <a:spcPts val="0"/>
+              </a:spcBef>
+              <a:spcAft>
+                <a:spcPts val="800"/>
+              </a:spcAft>
+              <a:buNone/>
+            </a:pPr>
+            <a:r>
+              <a:rPr lang="en-US" sz="2400" kern="100" dirty="0" err="1">
+                <a:effectLst/>
+                <a:latin typeface="Aptos" panose="020B0004020202020204" pitchFamily="34" charset="0"/>
+                <a:ea typeface="Aptos" panose="020B0004020202020204" pitchFamily="34" charset="0"/>
+                <a:cs typeface="Times New Roman" panose="02020603050405020304" pitchFamily="18" charset="0"/>
+              </a:rPr>
+              <a:t>ImmGen</a:t>
+            </a:r>
+            <a:r>
+              <a:rPr lang="en-US" sz="2400" kern="100" dirty="0">
+                <a:effectLst/>
+                <a:latin typeface="Aptos" panose="020B0004020202020204" pitchFamily="34" charset="0"/>
+                <a:ea typeface="Aptos" panose="020B0004020202020204" pitchFamily="34" charset="0"/>
+                <a:cs typeface="Times New Roman" panose="02020603050405020304" pitchFamily="18" charset="0"/>
+              </a:rPr>
+              <a:t> Test Cases</a:t>
+            </a:r>
+          </a:p>
+          <a:p>
+            <a:pPr marL="342900" marR="0" lvl="0" indent="-342900">
+              <a:lnSpc>
+                <a:spcPct val="107000"/>
+              </a:lnSpc>
+              <a:spcBef>
+                <a:spcPts val="0"/>
+              </a:spcBef>
+              <a:spcAft>
+                <a:spcPts val="0"/>
+              </a:spcAft>
+              <a:buFont typeface="Symbol" panose="05050102010706020507" pitchFamily="18" charset="2"/>
+              <a:buChar char=""/>
+            </a:pPr>
+            <a:r>
+              <a:rPr lang="en-US" sz="2400" kern="100" dirty="0">
+                <a:effectLst/>
+                <a:latin typeface="Aptos" panose="020B0004020202020204" pitchFamily="34" charset="0"/>
+                <a:ea typeface="Aptos" panose="020B0004020202020204" pitchFamily="34" charset="0"/>
+                <a:cs typeface="Times New Roman" panose="02020603050405020304" pitchFamily="18" charset="0"/>
+              </a:rPr>
+              <a:t>Input all instruction types with an immediate value, validate correct immediate</a:t>
+            </a:r>
+          </a:p>
+          <a:p>
+            <a:pPr marL="342900" marR="0" lvl="0" indent="-342900">
+              <a:lnSpc>
+                <a:spcPct val="107000"/>
+              </a:lnSpc>
+              <a:spcBef>
+                <a:spcPts val="0"/>
+              </a:spcBef>
+              <a:spcAft>
+                <a:spcPts val="800"/>
+              </a:spcAft>
+              <a:buFont typeface="Symbol" panose="05050102010706020507" pitchFamily="18" charset="2"/>
+              <a:buChar char=""/>
+            </a:pPr>
+            <a:r>
+              <a:rPr lang="en-US" sz="2400" kern="100" dirty="0">
+                <a:effectLst/>
+                <a:latin typeface="Aptos" panose="020B0004020202020204" pitchFamily="34" charset="0"/>
+                <a:ea typeface="Aptos" panose="020B0004020202020204" pitchFamily="34" charset="0"/>
+                <a:cs typeface="Times New Roman" panose="02020603050405020304" pitchFamily="18" charset="0"/>
+              </a:rPr>
+              <a:t>Ensure no immediate is generated if instruction doesn’t include an immediate</a:t>
+            </a:r>
+          </a:p>
+          <a:p>
+            <a:endParaRPr lang="en-US" sz="2400" dirty="0"/>
           </a:p>
         </p:txBody>
       </p:sp>
@@ -5562,7 +5764,7 @@
           <p:cNvPr id="5" name="Slide Number Placeholder 4">
             <a:extLst>
               <a:ext uri="{FF2B5EF4-FFF2-40B4-BE49-F238E27FC236}">
-                <a16:creationId xmlns:a16="http://schemas.microsoft.com/office/drawing/2014/main" id="{BD9C6C1B-2485-DA5C-E77A-5AE0B15EA8EE}"/>
+                <a16:creationId xmlns:a16="http://schemas.microsoft.com/office/drawing/2014/main" id="{12872916-28AA-76C1-E5AB-2D3481E9DDD8}"/>
               </a:ext>
             </a:extLst>
           </p:cNvPr>
@@ -5586,46 +5788,10 @@
           </a:p>
         </p:txBody>
       </p:sp>
-      <p:pic>
-        <p:nvPicPr>
-          <p:cNvPr id="7" name="Picture 6" descr="A screenshot of a computer program&#10;&#10;Description automatically generated">
-            <a:extLst>
-              <a:ext uri="{FF2B5EF4-FFF2-40B4-BE49-F238E27FC236}">
-                <a16:creationId xmlns:a16="http://schemas.microsoft.com/office/drawing/2014/main" id="{2F5C064D-A672-B3A3-274F-918C230D777A}"/>
-              </a:ext>
-            </a:extLst>
-          </p:cNvPr>
-          <p:cNvPicPr>
-            <a:picLocks noChangeAspect="1"/>
-          </p:cNvPicPr>
-          <p:nvPr/>
-        </p:nvPicPr>
-        <p:blipFill>
-          <a:blip r:embed="rId2">
-            <a:extLst>
-              <a:ext uri="{28A0092B-C50C-407E-A947-70E740481C1C}">
-                <a14:useLocalDpi xmlns:a14="http://schemas.microsoft.com/office/drawing/2010/main" val="0"/>
-              </a:ext>
-            </a:extLst>
-          </a:blip>
-          <a:stretch>
-            <a:fillRect/>
-          </a:stretch>
-        </p:blipFill>
-        <p:spPr>
-          <a:xfrm>
-            <a:off x="3173573" y="2096305"/>
-            <a:ext cx="5229031" cy="3982419"/>
-          </a:xfrm>
-          <a:prstGeom prst="rect">
-            <a:avLst/>
-          </a:prstGeom>
-        </p:spPr>
-      </p:pic>
     </p:spTree>
     <p:extLst>
       <p:ext uri="{BB962C8B-B14F-4D97-AF65-F5344CB8AC3E}">
-        <p14:creationId xmlns:p14="http://schemas.microsoft.com/office/powerpoint/2010/main" val="962049510"/>
+        <p14:creationId xmlns:p14="http://schemas.microsoft.com/office/powerpoint/2010/main" val="3565336280"/>
       </p:ext>
     </p:extLst>
   </p:cSld>
@@ -5657,7 +5823,7 @@
           <p:cNvPr id="2" name="Title 1">
             <a:extLst>
               <a:ext uri="{FF2B5EF4-FFF2-40B4-BE49-F238E27FC236}">
-                <a16:creationId xmlns:a16="http://schemas.microsoft.com/office/drawing/2014/main" id="{F15788A1-2A90-075C-0FD5-97BF4276DB6C}"/>
+                <a16:creationId xmlns:a16="http://schemas.microsoft.com/office/drawing/2014/main" id="{6346E85E-8D15-D4EB-CF18-9132EC62AC77}"/>
               </a:ext>
             </a:extLst>
           </p:cNvPr>
@@ -5680,7 +5846,7 @@
           <a:p>
             <a:r>
               <a:rPr lang="en-US" dirty="0"/>
-              <a:t>Registers</a:t>
+              <a:t>ALU</a:t>
             </a:r>
           </a:p>
         </p:txBody>
@@ -5690,7 +5856,7 @@
           <p:cNvPr id="3" name="Subtitle 2">
             <a:extLst>
               <a:ext uri="{FF2B5EF4-FFF2-40B4-BE49-F238E27FC236}">
-                <a16:creationId xmlns:a16="http://schemas.microsoft.com/office/drawing/2014/main" id="{13643ECA-8A7C-9241-6882-E71BD1F12C44}"/>
+                <a16:creationId xmlns:a16="http://schemas.microsoft.com/office/drawing/2014/main" id="{5B40D6B8-97AE-9397-3D32-EF0CF1737FFA}"/>
               </a:ext>
             </a:extLst>
           </p:cNvPr>
@@ -5706,10 +5872,7 @@
           <a:bodyPr/>
           <a:lstStyle/>
           <a:p>
-            <a:r>
-              <a:rPr lang="en-US" dirty="0"/>
-              <a:t>Test Cases</a:t>
-            </a:r>
+            <a:endParaRPr lang="en-US"/>
           </a:p>
         </p:txBody>
       </p:sp>
@@ -5718,7 +5881,7 @@
           <p:cNvPr id="4" name="Text Placeholder 3">
             <a:extLst>
               <a:ext uri="{FF2B5EF4-FFF2-40B4-BE49-F238E27FC236}">
-                <a16:creationId xmlns:a16="http://schemas.microsoft.com/office/drawing/2014/main" id="{44C21242-B2E4-CDBB-3C48-4C8E293DC8C1}"/>
+                <a16:creationId xmlns:a16="http://schemas.microsoft.com/office/drawing/2014/main" id="{D9B79D28-048B-F636-E90A-160DCFE6618C}"/>
               </a:ext>
             </a:extLst>
           </p:cNvPr>
@@ -5734,65 +5897,7 @@
           <a:bodyPr/>
           <a:lstStyle/>
           <a:p>
-            <a:r>
-              <a:rPr lang="en-US" dirty="0"/>
-              <a:t>Reset: check all registers are set to 0</a:t>
-            </a:r>
-          </a:p>
-          <a:p>
-            <a:r>
-              <a:rPr lang="en-US" dirty="0"/>
-              <a:t>With </a:t>
-            </a:r>
-            <a:r>
-              <a:rPr lang="en-US" dirty="0" err="1"/>
-              <a:t>write_enable</a:t>
-            </a:r>
-            <a:r>
-              <a:rPr lang="en-US" dirty="0"/>
-              <a:t> off, try writing  register: should be no change</a:t>
-            </a:r>
-          </a:p>
-          <a:p>
-            <a:r>
-              <a:rPr lang="en-US" dirty="0"/>
-              <a:t>With </a:t>
-            </a:r>
-            <a:r>
-              <a:rPr lang="en-US" dirty="0" err="1"/>
-              <a:t>write_enable</a:t>
-            </a:r>
-            <a:r>
-              <a:rPr lang="en-US" dirty="0"/>
-              <a:t> on, try writing to a register: check for correct value</a:t>
-            </a:r>
-          </a:p>
-          <a:p>
-            <a:r>
-              <a:rPr lang="en-US" dirty="0"/>
-              <a:t>Write random values to all registers, try reading all registers: check </a:t>
-            </a:r>
-            <a:r>
-              <a:rPr lang="en-US" dirty="0" err="1"/>
-              <a:t>data_read</a:t>
-            </a:r>
-            <a:r>
-              <a:rPr lang="en-US" dirty="0"/>
-              <a:t> is correct</a:t>
-            </a:r>
-          </a:p>
-          <a:p>
-            <a:pPr lvl="1"/>
-            <a:r>
-              <a:rPr lang="en-US" dirty="0"/>
-              <a:t>Do twice</a:t>
-            </a:r>
-          </a:p>
-          <a:p>
-            <a:r>
-              <a:rPr lang="en-US" dirty="0"/>
-              <a:t>Reset check again</a:t>
-            </a:r>
+            <a:endParaRPr lang="en-US"/>
           </a:p>
         </p:txBody>
       </p:sp>
@@ -5801,7 +5906,7 @@
           <p:cNvPr id="5" name="Slide Number Placeholder 4">
             <a:extLst>
               <a:ext uri="{FF2B5EF4-FFF2-40B4-BE49-F238E27FC236}">
-                <a16:creationId xmlns:a16="http://schemas.microsoft.com/office/drawing/2014/main" id="{BD9C6C1B-2485-DA5C-E77A-5AE0B15EA8EE}"/>
+                <a16:creationId xmlns:a16="http://schemas.microsoft.com/office/drawing/2014/main" id="{9BCE14E6-F19C-7BB3-E487-D0FA7CFF54C1}"/>
               </a:ext>
             </a:extLst>
           </p:cNvPr>
@@ -5825,46 +5930,10 @@
           </a:p>
         </p:txBody>
       </p:sp>
-      <p:pic>
-        <p:nvPicPr>
-          <p:cNvPr id="6" name="Picture 5" descr="A screenshot of a computer program&#10;&#10;Description automatically generated">
-            <a:extLst>
-              <a:ext uri="{FF2B5EF4-FFF2-40B4-BE49-F238E27FC236}">
-                <a16:creationId xmlns:a16="http://schemas.microsoft.com/office/drawing/2014/main" id="{3FE90927-5BAB-2661-0012-59DAD3BC8173}"/>
-              </a:ext>
-            </a:extLst>
-          </p:cNvPr>
-          <p:cNvPicPr>
-            <a:picLocks noChangeAspect="1"/>
-          </p:cNvPicPr>
-          <p:nvPr/>
-        </p:nvPicPr>
-        <p:blipFill>
-          <a:blip r:embed="rId2">
-            <a:extLst>
-              <a:ext uri="{28A0092B-C50C-407E-A947-70E740481C1C}">
-                <a14:useLocalDpi xmlns:a14="http://schemas.microsoft.com/office/drawing/2010/main" val="0"/>
-              </a:ext>
-            </a:extLst>
-          </a:blip>
-          <a:stretch>
-            <a:fillRect/>
-          </a:stretch>
-        </p:blipFill>
-        <p:spPr>
-          <a:xfrm>
-            <a:off x="8218857" y="3889244"/>
-            <a:ext cx="3780686" cy="2879363"/>
-          </a:xfrm>
-          <a:prstGeom prst="rect">
-            <a:avLst/>
-          </a:prstGeom>
-        </p:spPr>
-      </p:pic>
     </p:spTree>
     <p:extLst>
       <p:ext uri="{BB962C8B-B14F-4D97-AF65-F5344CB8AC3E}">
-        <p14:creationId xmlns:p14="http://schemas.microsoft.com/office/powerpoint/2010/main" val="46302471"/>
+        <p14:creationId xmlns:p14="http://schemas.microsoft.com/office/powerpoint/2010/main" val="176491562"/>
       </p:ext>
     </p:extLst>
   </p:cSld>
@@ -5896,7 +5965,7 @@
           <p:cNvPr id="2" name="Title 1">
             <a:extLst>
               <a:ext uri="{FF2B5EF4-FFF2-40B4-BE49-F238E27FC236}">
-                <a16:creationId xmlns:a16="http://schemas.microsoft.com/office/drawing/2014/main" id="{EB3F7B05-73DE-A491-5991-E04BBBC698CA}"/>
+                <a16:creationId xmlns:a16="http://schemas.microsoft.com/office/drawing/2014/main" id="{F15788A1-2A90-075C-0FD5-97BF4276DB6C}"/>
               </a:ext>
             </a:extLst>
           </p:cNvPr>
@@ -5919,7 +5988,7 @@
           <a:p>
             <a:r>
               <a:rPr lang="en-US" dirty="0"/>
-              <a:t>Memory</a:t>
+              <a:t>Registers</a:t>
             </a:r>
           </a:p>
         </p:txBody>
@@ -5929,7 +5998,7 @@
           <p:cNvPr id="3" name="Subtitle 2">
             <a:extLst>
               <a:ext uri="{FF2B5EF4-FFF2-40B4-BE49-F238E27FC236}">
-                <a16:creationId xmlns:a16="http://schemas.microsoft.com/office/drawing/2014/main" id="{AC823061-39AD-9D43-0432-59610A93A4A1}"/>
+                <a16:creationId xmlns:a16="http://schemas.microsoft.com/office/drawing/2014/main" id="{13643ECA-8A7C-9241-6882-E71BD1F12C44}"/>
               </a:ext>
             </a:extLst>
           </p:cNvPr>
@@ -5945,32 +6014,15 @@
           <a:bodyPr/>
           <a:lstStyle/>
           <a:p>
-            <a:endParaRPr lang="en-US"/>
-          </a:p>
-        </p:txBody>
-      </p:sp>
-      <p:sp>
-        <p:nvSpPr>
-          <p:cNvPr id="4" name="Text Placeholder 3">
-            <a:extLst>
-              <a:ext uri="{FF2B5EF4-FFF2-40B4-BE49-F238E27FC236}">
-                <a16:creationId xmlns:a16="http://schemas.microsoft.com/office/drawing/2014/main" id="{F2A18362-0849-C467-4293-A237B5A80012}"/>
-              </a:ext>
-            </a:extLst>
-          </p:cNvPr>
-          <p:cNvSpPr>
-            <a:spLocks noGrp="1"/>
-          </p:cNvSpPr>
-          <p:nvPr>
-            <p:ph type="body" sz="quarter" idx="14"/>
-          </p:nvPr>
-        </p:nvSpPr>
-        <p:spPr/>
-        <p:txBody>
-          <a:bodyPr/>
-          <a:lstStyle/>
-          <a:p>
-            <a:endParaRPr lang="en-US"/>
+            <a:r>
+              <a:rPr lang="en-US" dirty="0"/>
+              <a:t>Register RTL and </a:t>
+            </a:r>
+            <a:r>
+              <a:rPr lang="en-US" dirty="0" err="1"/>
+              <a:t>Psuedocode</a:t>
+            </a:r>
+            <a:endParaRPr lang="en-US" dirty="0"/>
           </a:p>
         </p:txBody>
       </p:sp>
@@ -5979,7 +6031,7 @@
           <p:cNvPr id="5" name="Slide Number Placeholder 4">
             <a:extLst>
               <a:ext uri="{FF2B5EF4-FFF2-40B4-BE49-F238E27FC236}">
-                <a16:creationId xmlns:a16="http://schemas.microsoft.com/office/drawing/2014/main" id="{2FCCDFDD-E919-B6ED-4B67-9F63171EB214}"/>
+                <a16:creationId xmlns:a16="http://schemas.microsoft.com/office/drawing/2014/main" id="{BD9C6C1B-2485-DA5C-E77A-5AE0B15EA8EE}"/>
               </a:ext>
             </a:extLst>
           </p:cNvPr>
@@ -6003,10 +6055,46 @@
           </a:p>
         </p:txBody>
       </p:sp>
+      <p:pic>
+        <p:nvPicPr>
+          <p:cNvPr id="7" name="Picture 6" descr="A screenshot of a computer program&#10;&#10;Description automatically generated">
+            <a:extLst>
+              <a:ext uri="{FF2B5EF4-FFF2-40B4-BE49-F238E27FC236}">
+                <a16:creationId xmlns:a16="http://schemas.microsoft.com/office/drawing/2014/main" id="{2F5C064D-A672-B3A3-274F-918C230D777A}"/>
+              </a:ext>
+            </a:extLst>
+          </p:cNvPr>
+          <p:cNvPicPr>
+            <a:picLocks noChangeAspect="1"/>
+          </p:cNvPicPr>
+          <p:nvPr/>
+        </p:nvPicPr>
+        <p:blipFill>
+          <a:blip r:embed="rId2">
+            <a:extLst>
+              <a:ext uri="{28A0092B-C50C-407E-A947-70E740481C1C}">
+                <a14:useLocalDpi xmlns:a14="http://schemas.microsoft.com/office/drawing/2010/main" val="0"/>
+              </a:ext>
+            </a:extLst>
+          </a:blip>
+          <a:stretch>
+            <a:fillRect/>
+          </a:stretch>
+        </p:blipFill>
+        <p:spPr>
+          <a:xfrm>
+            <a:off x="3173573" y="2096305"/>
+            <a:ext cx="5229031" cy="3982419"/>
+          </a:xfrm>
+          <a:prstGeom prst="rect">
+            <a:avLst/>
+          </a:prstGeom>
+        </p:spPr>
+      </p:pic>
     </p:spTree>
     <p:extLst>
       <p:ext uri="{BB962C8B-B14F-4D97-AF65-F5344CB8AC3E}">
-        <p14:creationId xmlns:p14="http://schemas.microsoft.com/office/powerpoint/2010/main" val="2869620282"/>
+        <p14:creationId xmlns:p14="http://schemas.microsoft.com/office/powerpoint/2010/main" val="962049510"/>
       </p:ext>
     </p:extLst>
   </p:cSld>
@@ -6038,7 +6126,7 @@
           <p:cNvPr id="2" name="Title 1">
             <a:extLst>
               <a:ext uri="{FF2B5EF4-FFF2-40B4-BE49-F238E27FC236}">
-                <a16:creationId xmlns:a16="http://schemas.microsoft.com/office/drawing/2014/main" id="{D1F6CC05-1F31-0C88-333C-5026AF10D397}"/>
+                <a16:creationId xmlns:a16="http://schemas.microsoft.com/office/drawing/2014/main" id="{F15788A1-2A90-075C-0FD5-97BF4276DB6C}"/>
               </a:ext>
             </a:extLst>
           </p:cNvPr>
@@ -6061,7 +6149,7 @@
           <a:p>
             <a:r>
               <a:rPr lang="en-US" dirty="0"/>
-              <a:t>Program Counter</a:t>
+              <a:t>Registers</a:t>
             </a:r>
           </a:p>
         </p:txBody>
@@ -6071,7 +6159,7 @@
           <p:cNvPr id="3" name="Subtitle 2">
             <a:extLst>
               <a:ext uri="{FF2B5EF4-FFF2-40B4-BE49-F238E27FC236}">
-                <a16:creationId xmlns:a16="http://schemas.microsoft.com/office/drawing/2014/main" id="{069353A1-7076-B958-432E-9B8FD5750AE7}"/>
+                <a16:creationId xmlns:a16="http://schemas.microsoft.com/office/drawing/2014/main" id="{13643ECA-8A7C-9241-6882-E71BD1F12C44}"/>
               </a:ext>
             </a:extLst>
           </p:cNvPr>
@@ -6089,7 +6177,90 @@
           <a:p>
             <a:r>
               <a:rPr lang="en-US" dirty="0"/>
-              <a:t>RTL Diagram and Input/Output</a:t>
+              <a:t>Test Cases</a:t>
+            </a:r>
+          </a:p>
+        </p:txBody>
+      </p:sp>
+      <p:sp>
+        <p:nvSpPr>
+          <p:cNvPr id="4" name="Text Placeholder 3">
+            <a:extLst>
+              <a:ext uri="{FF2B5EF4-FFF2-40B4-BE49-F238E27FC236}">
+                <a16:creationId xmlns:a16="http://schemas.microsoft.com/office/drawing/2014/main" id="{44C21242-B2E4-CDBB-3C48-4C8E293DC8C1}"/>
+              </a:ext>
+            </a:extLst>
+          </p:cNvPr>
+          <p:cNvSpPr>
+            <a:spLocks noGrp="1"/>
+          </p:cNvSpPr>
+          <p:nvPr>
+            <p:ph type="body" sz="quarter" idx="14"/>
+          </p:nvPr>
+        </p:nvSpPr>
+        <p:spPr/>
+        <p:txBody>
+          <a:bodyPr/>
+          <a:lstStyle/>
+          <a:p>
+            <a:r>
+              <a:rPr lang="en-US" dirty="0"/>
+              <a:t>Reset: check all registers are set to 0</a:t>
+            </a:r>
+          </a:p>
+          <a:p>
+            <a:r>
+              <a:rPr lang="en-US" dirty="0"/>
+              <a:t>With </a:t>
+            </a:r>
+            <a:r>
+              <a:rPr lang="en-US" dirty="0" err="1"/>
+              <a:t>write_enable</a:t>
+            </a:r>
+            <a:r>
+              <a:rPr lang="en-US" dirty="0"/>
+              <a:t> off, try writing  register: should be no change</a:t>
+            </a:r>
+          </a:p>
+          <a:p>
+            <a:r>
+              <a:rPr lang="en-US" dirty="0"/>
+              <a:t>With </a:t>
+            </a:r>
+            <a:r>
+              <a:rPr lang="en-US" dirty="0" err="1"/>
+              <a:t>write_enable</a:t>
+            </a:r>
+            <a:r>
+              <a:rPr lang="en-US" dirty="0"/>
+              <a:t> on, try writing to a register: check for correct value</a:t>
+            </a:r>
+          </a:p>
+          <a:p>
+            <a:r>
+              <a:rPr lang="en-US" dirty="0"/>
+              <a:t>Write random values to all registers, try reading all registers: check </a:t>
+            </a:r>
+            <a:r>
+              <a:rPr lang="en-US" dirty="0" err="1"/>
+              <a:t>data_read</a:t>
+            </a:r>
+            <a:r>
+              <a:rPr lang="en-US" dirty="0"/>
+              <a:t> is correct</a:t>
+            </a:r>
+          </a:p>
+          <a:p>
+            <a:pPr lvl="1"/>
+            <a:r>
+              <a:rPr lang="en-US" dirty="0"/>
+              <a:t>Do twice</a:t>
+            </a:r>
+          </a:p>
+          <a:p>
+            <a:r>
+              <a:rPr lang="en-US" dirty="0"/>
+              <a:t>Reset check again</a:t>
             </a:r>
           </a:p>
         </p:txBody>
@@ -6099,7 +6270,7 @@
           <p:cNvPr id="5" name="Slide Number Placeholder 4">
             <a:extLst>
               <a:ext uri="{FF2B5EF4-FFF2-40B4-BE49-F238E27FC236}">
-                <a16:creationId xmlns:a16="http://schemas.microsoft.com/office/drawing/2014/main" id="{A896B40E-DC06-49BF-BFD3-304517BB06A3}"/>
+                <a16:creationId xmlns:a16="http://schemas.microsoft.com/office/drawing/2014/main" id="{BD9C6C1B-2485-DA5C-E77A-5AE0B15EA8EE}"/>
               </a:ext>
             </a:extLst>
           </p:cNvPr>
@@ -6125,10 +6296,10 @@
       </p:sp>
       <p:pic>
         <p:nvPicPr>
-          <p:cNvPr id="9" name="Picture 8" descr="A black and white screen with white text&#10;&#10;Description automatically generated">
-            <a:extLst>
-              <a:ext uri="{FF2B5EF4-FFF2-40B4-BE49-F238E27FC236}">
-                <a16:creationId xmlns:a16="http://schemas.microsoft.com/office/drawing/2014/main" id="{602A898A-4DC4-D63A-A6B4-668E5E561D40}"/>
+          <p:cNvPr id="6" name="Picture 5" descr="A screenshot of a computer program&#10;&#10;Description automatically generated">
+            <a:extLst>
+              <a:ext uri="{FF2B5EF4-FFF2-40B4-BE49-F238E27FC236}">
+                <a16:creationId xmlns:a16="http://schemas.microsoft.com/office/drawing/2014/main" id="{3FE90927-5BAB-2661-0012-59DAD3BC8173}"/>
               </a:ext>
             </a:extLst>
           </p:cNvPr>
@@ -6137,7 +6308,7 @@
           </p:cNvPicPr>
           <p:nvPr/>
         </p:nvPicPr>
-        <p:blipFill rotWithShape="1">
+        <p:blipFill>
           <a:blip r:embed="rId2">
             <a:extLst>
               <a:ext uri="{28A0092B-C50C-407E-A947-70E740481C1C}">
@@ -6145,48 +6316,14 @@
               </a:ext>
             </a:extLst>
           </a:blip>
-          <a:srcRect l="51863" b="55404"/>
-          <a:stretch/>
+          <a:stretch>
+            <a:fillRect/>
+          </a:stretch>
         </p:blipFill>
         <p:spPr>
           <a:xfrm>
-            <a:off x="1259633" y="2763923"/>
-            <a:ext cx="4259521" cy="2425474"/>
-          </a:xfrm>
-          <a:prstGeom prst="rect">
-            <a:avLst/>
-          </a:prstGeom>
-        </p:spPr>
-      </p:pic>
-      <p:pic>
-        <p:nvPicPr>
-          <p:cNvPr id="10" name="Picture 9" descr="A black and white screen with white text&#10;&#10;Description automatically generated">
-            <a:extLst>
-              <a:ext uri="{FF2B5EF4-FFF2-40B4-BE49-F238E27FC236}">
-                <a16:creationId xmlns:a16="http://schemas.microsoft.com/office/drawing/2014/main" id="{0C30E131-177D-F6B8-0AE8-D5CF155B5289}"/>
-              </a:ext>
-            </a:extLst>
-          </p:cNvPr>
-          <p:cNvPicPr>
-            <a:picLocks noChangeAspect="1"/>
-          </p:cNvPicPr>
-          <p:nvPr/>
-        </p:nvPicPr>
-        <p:blipFill rotWithShape="1">
-          <a:blip r:embed="rId2">
-            <a:extLst>
-              <a:ext uri="{28A0092B-C50C-407E-A947-70E740481C1C}">
-                <a14:useLocalDpi xmlns:a14="http://schemas.microsoft.com/office/drawing/2010/main" val="0"/>
-              </a:ext>
-            </a:extLst>
-          </a:blip>
-          <a:srcRect t="27955" r="77451" b="39963"/>
-          <a:stretch/>
-        </p:blipFill>
-        <p:spPr>
-          <a:xfrm>
-            <a:off x="6875008" y="2728679"/>
-            <a:ext cx="1995294" cy="1744825"/>
+            <a:off x="8218857" y="3889244"/>
+            <a:ext cx="3780686" cy="2879363"/>
           </a:xfrm>
           <a:prstGeom prst="rect">
             <a:avLst/>
@@ -6196,7 +6333,7 @@
     </p:spTree>
     <p:extLst>
       <p:ext uri="{BB962C8B-B14F-4D97-AF65-F5344CB8AC3E}">
-        <p14:creationId xmlns:p14="http://schemas.microsoft.com/office/powerpoint/2010/main" val="1617301959"/>
+        <p14:creationId xmlns:p14="http://schemas.microsoft.com/office/powerpoint/2010/main" val="46302471"/>
       </p:ext>
     </p:extLst>
   </p:cSld>
@@ -6228,7 +6365,7 @@
           <p:cNvPr id="2" name="Title 1">
             <a:extLst>
               <a:ext uri="{FF2B5EF4-FFF2-40B4-BE49-F238E27FC236}">
-                <a16:creationId xmlns:a16="http://schemas.microsoft.com/office/drawing/2014/main" id="{D1F6CC05-1F31-0C88-333C-5026AF10D397}"/>
+                <a16:creationId xmlns:a16="http://schemas.microsoft.com/office/drawing/2014/main" id="{EB3F7B05-73DE-A491-5991-E04BBBC698CA}"/>
               </a:ext>
             </a:extLst>
           </p:cNvPr>
@@ -6251,7 +6388,7 @@
           <a:p>
             <a:r>
               <a:rPr lang="en-US" dirty="0"/>
-              <a:t>Program Counter</a:t>
+              <a:t>Memory</a:t>
             </a:r>
           </a:p>
         </p:txBody>
@@ -6261,7 +6398,7 @@
           <p:cNvPr id="3" name="Subtitle 2">
             <a:extLst>
               <a:ext uri="{FF2B5EF4-FFF2-40B4-BE49-F238E27FC236}">
-                <a16:creationId xmlns:a16="http://schemas.microsoft.com/office/drawing/2014/main" id="{069353A1-7076-B958-432E-9B8FD5750AE7}"/>
+                <a16:creationId xmlns:a16="http://schemas.microsoft.com/office/drawing/2014/main" id="{AC823061-39AD-9D43-0432-59610A93A4A1}"/>
               </a:ext>
             </a:extLst>
           </p:cNvPr>
@@ -6277,10 +6414,32 @@
           <a:bodyPr/>
           <a:lstStyle/>
           <a:p>
-            <a:r>
-              <a:rPr lang="en-US" dirty="0"/>
-              <a:t>Logic and Test Cases</a:t>
-            </a:r>
+            <a:endParaRPr lang="en-US"/>
+          </a:p>
+        </p:txBody>
+      </p:sp>
+      <p:sp>
+        <p:nvSpPr>
+          <p:cNvPr id="4" name="Text Placeholder 3">
+            <a:extLst>
+              <a:ext uri="{FF2B5EF4-FFF2-40B4-BE49-F238E27FC236}">
+                <a16:creationId xmlns:a16="http://schemas.microsoft.com/office/drawing/2014/main" id="{F2A18362-0849-C467-4293-A237B5A80012}"/>
+              </a:ext>
+            </a:extLst>
+          </p:cNvPr>
+          <p:cNvSpPr>
+            <a:spLocks noGrp="1"/>
+          </p:cNvSpPr>
+          <p:nvPr>
+            <p:ph type="body" sz="quarter" idx="14"/>
+          </p:nvPr>
+        </p:nvSpPr>
+        <p:spPr/>
+        <p:txBody>
+          <a:bodyPr/>
+          <a:lstStyle/>
+          <a:p>
+            <a:endParaRPr lang="en-US"/>
           </a:p>
         </p:txBody>
       </p:sp>
@@ -6289,7 +6448,7 @@
           <p:cNvPr id="5" name="Slide Number Placeholder 4">
             <a:extLst>
               <a:ext uri="{FF2B5EF4-FFF2-40B4-BE49-F238E27FC236}">
-                <a16:creationId xmlns:a16="http://schemas.microsoft.com/office/drawing/2014/main" id="{A896B40E-DC06-49BF-BFD3-304517BB06A3}"/>
+                <a16:creationId xmlns:a16="http://schemas.microsoft.com/office/drawing/2014/main" id="{2FCCDFDD-E919-B6ED-4B67-9F63171EB214}"/>
               </a:ext>
             </a:extLst>
           </p:cNvPr>
@@ -6313,74 +6472,10 @@
           </a:p>
         </p:txBody>
       </p:sp>
-      <p:pic>
-        <p:nvPicPr>
-          <p:cNvPr id="4" name="Picture 3" descr="A black and white screen with white text&#10;&#10;Description automatically generated">
-            <a:extLst>
-              <a:ext uri="{FF2B5EF4-FFF2-40B4-BE49-F238E27FC236}">
-                <a16:creationId xmlns:a16="http://schemas.microsoft.com/office/drawing/2014/main" id="{25367EB2-360C-B712-60AE-079171120897}"/>
-              </a:ext>
-            </a:extLst>
-          </p:cNvPr>
-          <p:cNvPicPr>
-            <a:picLocks noChangeAspect="1"/>
-          </p:cNvPicPr>
-          <p:nvPr/>
-        </p:nvPicPr>
-        <p:blipFill rotWithShape="1">
-          <a:blip r:embed="rId2">
-            <a:extLst>
-              <a:ext uri="{28A0092B-C50C-407E-A947-70E740481C1C}">
-                <a14:useLocalDpi xmlns:a14="http://schemas.microsoft.com/office/drawing/2010/main" val="0"/>
-              </a:ext>
-            </a:extLst>
-          </a:blip>
-          <a:srcRect t="63467" r="30844"/>
-          <a:stretch/>
-        </p:blipFill>
-        <p:spPr>
-          <a:xfrm>
-            <a:off x="1067822" y="2096305"/>
-            <a:ext cx="10056355" cy="3265228"/>
-          </a:xfrm>
-          <a:prstGeom prst="rect">
-            <a:avLst/>
-          </a:prstGeom>
-        </p:spPr>
-      </p:pic>
-      <p:pic>
-        <p:nvPicPr>
-          <p:cNvPr id="7" name="Picture 6">
-            <a:extLst>
-              <a:ext uri="{FF2B5EF4-FFF2-40B4-BE49-F238E27FC236}">
-                <a16:creationId xmlns:a16="http://schemas.microsoft.com/office/drawing/2014/main" id="{D6CA6F6B-57FF-1C2B-3B06-D79B575C3413}"/>
-              </a:ext>
-            </a:extLst>
-          </p:cNvPr>
-          <p:cNvPicPr>
-            <a:picLocks noChangeAspect="1"/>
-          </p:cNvPicPr>
-          <p:nvPr/>
-        </p:nvPicPr>
-        <p:blipFill rotWithShape="1">
-          <a:blip r:embed="rId3"/>
-          <a:srcRect l="2457" t="5161" r="1322" b="2363"/>
-          <a:stretch/>
-        </p:blipFill>
-        <p:spPr>
-          <a:xfrm>
-            <a:off x="1067822" y="1831490"/>
-            <a:ext cx="4595860" cy="4019812"/>
-          </a:xfrm>
-          <a:prstGeom prst="rect">
-            <a:avLst/>
-          </a:prstGeom>
-        </p:spPr>
-      </p:pic>
     </p:spTree>
     <p:extLst>
       <p:ext uri="{BB962C8B-B14F-4D97-AF65-F5344CB8AC3E}">
-        <p14:creationId xmlns:p14="http://schemas.microsoft.com/office/powerpoint/2010/main" val="3391675750"/>
+        <p14:creationId xmlns:p14="http://schemas.microsoft.com/office/powerpoint/2010/main" val="2869620282"/>
       </p:ext>
     </p:extLst>
   </p:cSld>
@@ -6412,7 +6507,7 @@
           <p:cNvPr id="2" name="Title 1">
             <a:extLst>
               <a:ext uri="{FF2B5EF4-FFF2-40B4-BE49-F238E27FC236}">
-                <a16:creationId xmlns:a16="http://schemas.microsoft.com/office/drawing/2014/main" id="{EEAF6D0A-7814-2A94-F47A-3ECC7B8EDE59}"/>
+                <a16:creationId xmlns:a16="http://schemas.microsoft.com/office/drawing/2014/main" id="{D1F6CC05-1F31-0C88-333C-5026AF10D397}"/>
               </a:ext>
             </a:extLst>
           </p:cNvPr>
@@ -6435,7 +6530,7 @@
           <a:p>
             <a:r>
               <a:rPr lang="en-US" dirty="0"/>
-              <a:t>Peripherals</a:t>
+              <a:t>Program Counter</a:t>
             </a:r>
           </a:p>
         </p:txBody>
@@ -6445,7 +6540,7 @@
           <p:cNvPr id="3" name="Subtitle 2">
             <a:extLst>
               <a:ext uri="{FF2B5EF4-FFF2-40B4-BE49-F238E27FC236}">
-                <a16:creationId xmlns:a16="http://schemas.microsoft.com/office/drawing/2014/main" id="{FFF467C2-55D2-EC86-825B-16EBAE111702}"/>
+                <a16:creationId xmlns:a16="http://schemas.microsoft.com/office/drawing/2014/main" id="{069353A1-7076-B958-432E-9B8FD5750AE7}"/>
               </a:ext>
             </a:extLst>
           </p:cNvPr>
@@ -6461,35 +6556,10 @@
           <a:bodyPr/>
           <a:lstStyle/>
           <a:p>
-            <a:endParaRPr lang="en-US"/>
-          </a:p>
-        </p:txBody>
-      </p:sp>
-      <p:sp>
-        <p:nvSpPr>
-          <p:cNvPr id="4" name="Text Placeholder 3">
-            <a:extLst>
-              <a:ext uri="{FF2B5EF4-FFF2-40B4-BE49-F238E27FC236}">
-                <a16:creationId xmlns:a16="http://schemas.microsoft.com/office/drawing/2014/main" id="{5DF050C2-2C1C-78CA-C656-82D41545CD8E}"/>
-              </a:ext>
-            </a:extLst>
-          </p:cNvPr>
-          <p:cNvSpPr>
-            <a:spLocks noGrp="1"/>
-          </p:cNvSpPr>
-          <p:nvPr>
-            <p:ph type="body" sz="quarter" idx="14"/>
-          </p:nvPr>
-        </p:nvSpPr>
-        <p:spPr/>
-        <p:txBody>
-          <a:bodyPr/>
-          <a:lstStyle/>
-          <a:p>
-            <a:pPr marL="0" indent="0">
-              <a:buNone/>
-            </a:pPr>
-            <a:endParaRPr lang="en-US" dirty="0"/>
+            <a:r>
+              <a:rPr lang="en-US" dirty="0"/>
+              <a:t>RTL Diagram and Input/Output</a:t>
+            </a:r>
           </a:p>
         </p:txBody>
       </p:sp>
@@ -6498,7 +6568,7 @@
           <p:cNvPr id="5" name="Slide Number Placeholder 4">
             <a:extLst>
               <a:ext uri="{FF2B5EF4-FFF2-40B4-BE49-F238E27FC236}">
-                <a16:creationId xmlns:a16="http://schemas.microsoft.com/office/drawing/2014/main" id="{D098254D-9CED-6343-6D6F-6FF0B8DDD786}"/>
+                <a16:creationId xmlns:a16="http://schemas.microsoft.com/office/drawing/2014/main" id="{A896B40E-DC06-49BF-BFD3-304517BB06A3}"/>
               </a:ext>
             </a:extLst>
           </p:cNvPr>
@@ -6522,10 +6592,80 @@
           </a:p>
         </p:txBody>
       </p:sp>
+      <p:pic>
+        <p:nvPicPr>
+          <p:cNvPr id="9" name="Picture 8" descr="A black and white screen with white text&#10;&#10;Description automatically generated">
+            <a:extLst>
+              <a:ext uri="{FF2B5EF4-FFF2-40B4-BE49-F238E27FC236}">
+                <a16:creationId xmlns:a16="http://schemas.microsoft.com/office/drawing/2014/main" id="{602A898A-4DC4-D63A-A6B4-668E5E561D40}"/>
+              </a:ext>
+            </a:extLst>
+          </p:cNvPr>
+          <p:cNvPicPr>
+            <a:picLocks noChangeAspect="1"/>
+          </p:cNvPicPr>
+          <p:nvPr/>
+        </p:nvPicPr>
+        <p:blipFill rotWithShape="1">
+          <a:blip r:embed="rId2">
+            <a:extLst>
+              <a:ext uri="{28A0092B-C50C-407E-A947-70E740481C1C}">
+                <a14:useLocalDpi xmlns:a14="http://schemas.microsoft.com/office/drawing/2010/main" val="0"/>
+              </a:ext>
+            </a:extLst>
+          </a:blip>
+          <a:srcRect l="51863" b="55404"/>
+          <a:stretch/>
+        </p:blipFill>
+        <p:spPr>
+          <a:xfrm>
+            <a:off x="1259633" y="2763923"/>
+            <a:ext cx="4259521" cy="2425474"/>
+          </a:xfrm>
+          <a:prstGeom prst="rect">
+            <a:avLst/>
+          </a:prstGeom>
+        </p:spPr>
+      </p:pic>
+      <p:pic>
+        <p:nvPicPr>
+          <p:cNvPr id="10" name="Picture 9" descr="A black and white screen with white text&#10;&#10;Description automatically generated">
+            <a:extLst>
+              <a:ext uri="{FF2B5EF4-FFF2-40B4-BE49-F238E27FC236}">
+                <a16:creationId xmlns:a16="http://schemas.microsoft.com/office/drawing/2014/main" id="{0C30E131-177D-F6B8-0AE8-D5CF155B5289}"/>
+              </a:ext>
+            </a:extLst>
+          </p:cNvPr>
+          <p:cNvPicPr>
+            <a:picLocks noChangeAspect="1"/>
+          </p:cNvPicPr>
+          <p:nvPr/>
+        </p:nvPicPr>
+        <p:blipFill rotWithShape="1">
+          <a:blip r:embed="rId2">
+            <a:extLst>
+              <a:ext uri="{28A0092B-C50C-407E-A947-70E740481C1C}">
+                <a14:useLocalDpi xmlns:a14="http://schemas.microsoft.com/office/drawing/2010/main" val="0"/>
+              </a:ext>
+            </a:extLst>
+          </a:blip>
+          <a:srcRect t="27955" r="77451" b="39963"/>
+          <a:stretch/>
+        </p:blipFill>
+        <p:spPr>
+          <a:xfrm>
+            <a:off x="6875008" y="2728679"/>
+            <a:ext cx="1995294" cy="1744825"/>
+          </a:xfrm>
+          <a:prstGeom prst="rect">
+            <a:avLst/>
+          </a:prstGeom>
+        </p:spPr>
+      </p:pic>
     </p:spTree>
     <p:extLst>
       <p:ext uri="{BB962C8B-B14F-4D97-AF65-F5344CB8AC3E}">
-        <p14:creationId xmlns:p14="http://schemas.microsoft.com/office/powerpoint/2010/main" val="673691625"/>
+        <p14:creationId xmlns:p14="http://schemas.microsoft.com/office/powerpoint/2010/main" val="1617301959"/>
       </p:ext>
     </p:extLst>
   </p:cSld>
@@ -6557,7 +6697,7 @@
           <p:cNvPr id="2" name="Title 1">
             <a:extLst>
               <a:ext uri="{FF2B5EF4-FFF2-40B4-BE49-F238E27FC236}">
-                <a16:creationId xmlns:a16="http://schemas.microsoft.com/office/drawing/2014/main" id="{84E2E6AF-4C46-F611-0830-0584094CF72D}"/>
+                <a16:creationId xmlns:a16="http://schemas.microsoft.com/office/drawing/2014/main" id="{D1F6CC05-1F31-0C88-333C-5026AF10D397}"/>
               </a:ext>
             </a:extLst>
           </p:cNvPr>
@@ -6580,7 +6720,7 @@
           <a:p>
             <a:r>
               <a:rPr lang="en-US" dirty="0"/>
-              <a:t>Expected Obstacles</a:t>
+              <a:t>Program Counter</a:t>
             </a:r>
           </a:p>
         </p:txBody>
@@ -6590,7 +6730,7 @@
           <p:cNvPr id="3" name="Subtitle 2">
             <a:extLst>
               <a:ext uri="{FF2B5EF4-FFF2-40B4-BE49-F238E27FC236}">
-                <a16:creationId xmlns:a16="http://schemas.microsoft.com/office/drawing/2014/main" id="{471C2136-9DD0-D267-3D8B-A8EE373D98E0}"/>
+                <a16:creationId xmlns:a16="http://schemas.microsoft.com/office/drawing/2014/main" id="{069353A1-7076-B958-432E-9B8FD5750AE7}"/>
               </a:ext>
             </a:extLst>
           </p:cNvPr>
@@ -6606,32 +6746,10 @@
           <a:bodyPr/>
           <a:lstStyle/>
           <a:p>
-            <a:endParaRPr lang="en-US"/>
-          </a:p>
-        </p:txBody>
-      </p:sp>
-      <p:sp>
-        <p:nvSpPr>
-          <p:cNvPr id="4" name="Text Placeholder 3">
-            <a:extLst>
-              <a:ext uri="{FF2B5EF4-FFF2-40B4-BE49-F238E27FC236}">
-                <a16:creationId xmlns:a16="http://schemas.microsoft.com/office/drawing/2014/main" id="{B44DD88A-56DA-9FD9-78FF-2228D1EE0F97}"/>
-              </a:ext>
-            </a:extLst>
-          </p:cNvPr>
-          <p:cNvSpPr>
-            <a:spLocks noGrp="1"/>
-          </p:cNvSpPr>
-          <p:nvPr>
-            <p:ph type="body" sz="quarter" idx="14"/>
-          </p:nvPr>
-        </p:nvSpPr>
-        <p:spPr/>
-        <p:txBody>
-          <a:bodyPr/>
-          <a:lstStyle/>
-          <a:p>
-            <a:endParaRPr lang="en-US"/>
+            <a:r>
+              <a:rPr lang="en-US" dirty="0"/>
+              <a:t>Logic and Test Cases</a:t>
+            </a:r>
           </a:p>
         </p:txBody>
       </p:sp>
@@ -6640,7 +6758,7 @@
           <p:cNvPr id="5" name="Slide Number Placeholder 4">
             <a:extLst>
               <a:ext uri="{FF2B5EF4-FFF2-40B4-BE49-F238E27FC236}">
-                <a16:creationId xmlns:a16="http://schemas.microsoft.com/office/drawing/2014/main" id="{682D4168-ECD1-209B-6680-7551993E2135}"/>
+                <a16:creationId xmlns:a16="http://schemas.microsoft.com/office/drawing/2014/main" id="{A896B40E-DC06-49BF-BFD3-304517BB06A3}"/>
               </a:ext>
             </a:extLst>
           </p:cNvPr>
@@ -6664,10 +6782,74 @@
           </a:p>
         </p:txBody>
       </p:sp>
+      <p:pic>
+        <p:nvPicPr>
+          <p:cNvPr id="4" name="Picture 3" descr="A black and white screen with white text&#10;&#10;Description automatically generated">
+            <a:extLst>
+              <a:ext uri="{FF2B5EF4-FFF2-40B4-BE49-F238E27FC236}">
+                <a16:creationId xmlns:a16="http://schemas.microsoft.com/office/drawing/2014/main" id="{25367EB2-360C-B712-60AE-079171120897}"/>
+              </a:ext>
+            </a:extLst>
+          </p:cNvPr>
+          <p:cNvPicPr>
+            <a:picLocks noChangeAspect="1"/>
+          </p:cNvPicPr>
+          <p:nvPr/>
+        </p:nvPicPr>
+        <p:blipFill rotWithShape="1">
+          <a:blip r:embed="rId2">
+            <a:extLst>
+              <a:ext uri="{28A0092B-C50C-407E-A947-70E740481C1C}">
+                <a14:useLocalDpi xmlns:a14="http://schemas.microsoft.com/office/drawing/2010/main" val="0"/>
+              </a:ext>
+            </a:extLst>
+          </a:blip>
+          <a:srcRect t="63467" r="30844"/>
+          <a:stretch/>
+        </p:blipFill>
+        <p:spPr>
+          <a:xfrm>
+            <a:off x="1067822" y="2096305"/>
+            <a:ext cx="10056355" cy="3265228"/>
+          </a:xfrm>
+          <a:prstGeom prst="rect">
+            <a:avLst/>
+          </a:prstGeom>
+        </p:spPr>
+      </p:pic>
+      <p:pic>
+        <p:nvPicPr>
+          <p:cNvPr id="7" name="Picture 6">
+            <a:extLst>
+              <a:ext uri="{FF2B5EF4-FFF2-40B4-BE49-F238E27FC236}">
+                <a16:creationId xmlns:a16="http://schemas.microsoft.com/office/drawing/2014/main" id="{D6CA6F6B-57FF-1C2B-3B06-D79B575C3413}"/>
+              </a:ext>
+            </a:extLst>
+          </p:cNvPr>
+          <p:cNvPicPr>
+            <a:picLocks noChangeAspect="1"/>
+          </p:cNvPicPr>
+          <p:nvPr/>
+        </p:nvPicPr>
+        <p:blipFill rotWithShape="1">
+          <a:blip r:embed="rId3"/>
+          <a:srcRect l="2457" t="5161" r="1322" b="2363"/>
+          <a:stretch/>
+        </p:blipFill>
+        <p:spPr>
+          <a:xfrm>
+            <a:off x="1067822" y="1831490"/>
+            <a:ext cx="4595860" cy="4019812"/>
+          </a:xfrm>
+          <a:prstGeom prst="rect">
+            <a:avLst/>
+          </a:prstGeom>
+        </p:spPr>
+      </p:pic>
     </p:spTree>
     <p:extLst>
       <p:ext uri="{BB962C8B-B14F-4D97-AF65-F5344CB8AC3E}">
-        <p14:creationId xmlns:p14="http://schemas.microsoft.com/office/powerpoint/2010/main" val="3140182961"/>
+        <p14:creationId xmlns:p14="http://schemas.microsoft.com/office/powerpoint/2010/main" val="3391675750"/>
       </p:ext>
     </p:extLst>
   </p:cSld>
@@ -6699,7 +6881,7 @@
           <p:cNvPr id="2" name="Title 1">
             <a:extLst>
               <a:ext uri="{FF2B5EF4-FFF2-40B4-BE49-F238E27FC236}">
-                <a16:creationId xmlns:a16="http://schemas.microsoft.com/office/drawing/2014/main" id="{6799C4B2-C790-FB8B-4821-10F77E122C20}"/>
+                <a16:creationId xmlns:a16="http://schemas.microsoft.com/office/drawing/2014/main" id="{EEAF6D0A-7814-2A94-F47A-3ECC7B8EDE59}"/>
               </a:ext>
             </a:extLst>
           </p:cNvPr>
@@ -6722,7 +6904,7 @@
           <a:p>
             <a:r>
               <a:rPr lang="en-US" dirty="0"/>
-              <a:t>Future Plans</a:t>
+              <a:t>Peripherals</a:t>
             </a:r>
           </a:p>
         </p:txBody>
@@ -6732,7 +6914,7 @@
           <p:cNvPr id="3" name="Subtitle 2">
             <a:extLst>
               <a:ext uri="{FF2B5EF4-FFF2-40B4-BE49-F238E27FC236}">
-                <a16:creationId xmlns:a16="http://schemas.microsoft.com/office/drawing/2014/main" id="{E03FFE2C-5D65-D6E4-2FE1-7A95922722D1}"/>
+                <a16:creationId xmlns:a16="http://schemas.microsoft.com/office/drawing/2014/main" id="{FFF467C2-55D2-EC86-825B-16EBAE111702}"/>
               </a:ext>
             </a:extLst>
           </p:cNvPr>
@@ -6757,7 +6939,7 @@
           <p:cNvPr id="4" name="Text Placeholder 3">
             <a:extLst>
               <a:ext uri="{FF2B5EF4-FFF2-40B4-BE49-F238E27FC236}">
-                <a16:creationId xmlns:a16="http://schemas.microsoft.com/office/drawing/2014/main" id="{7794BFF1-E7A0-748B-9321-5A00891D805A}"/>
+                <a16:creationId xmlns:a16="http://schemas.microsoft.com/office/drawing/2014/main" id="{5DF050C2-2C1C-78CA-C656-82D41545CD8E}"/>
               </a:ext>
             </a:extLst>
           </p:cNvPr>
@@ -6773,10 +6955,10 @@
           <a:bodyPr/>
           <a:lstStyle/>
           <a:p>
-            <a:r>
-              <a:rPr lang="en-US" dirty="0"/>
-              <a:t>Error correction?</a:t>
-            </a:r>
+            <a:pPr marL="0" indent="0">
+              <a:buNone/>
+            </a:pPr>
+            <a:endParaRPr lang="en-US" dirty="0"/>
           </a:p>
         </p:txBody>
       </p:sp>
@@ -6785,7 +6967,7 @@
           <p:cNvPr id="5" name="Slide Number Placeholder 4">
             <a:extLst>
               <a:ext uri="{FF2B5EF4-FFF2-40B4-BE49-F238E27FC236}">
-                <a16:creationId xmlns:a16="http://schemas.microsoft.com/office/drawing/2014/main" id="{5BDDAFA0-D6CE-5536-5E75-4528A2EC55BD}"/>
+                <a16:creationId xmlns:a16="http://schemas.microsoft.com/office/drawing/2014/main" id="{D098254D-9CED-6343-6D6F-6FF0B8DDD786}"/>
               </a:ext>
             </a:extLst>
           </p:cNvPr>
@@ -6812,7 +6994,149 @@
     </p:spTree>
     <p:extLst>
       <p:ext uri="{BB962C8B-B14F-4D97-AF65-F5344CB8AC3E}">
-        <p14:creationId xmlns:p14="http://schemas.microsoft.com/office/powerpoint/2010/main" val="391822046"/>
+        <p14:creationId xmlns:p14="http://schemas.microsoft.com/office/powerpoint/2010/main" val="673691625"/>
+      </p:ext>
+    </p:extLst>
+  </p:cSld>
+  <p:clrMapOvr>
+    <a:masterClrMapping/>
+  </p:clrMapOvr>
+</p:sld>
+</file>
+
+<file path=ppt/slides/slide19.xml><?xml version="1.0" encoding="utf-8"?>
+<p:sld xmlns:a="http://schemas.openxmlformats.org/drawingml/2006/main" xmlns:r="http://schemas.openxmlformats.org/officeDocument/2006/relationships" xmlns:p="http://schemas.openxmlformats.org/presentationml/2006/main">
+  <p:cSld>
+    <p:spTree>
+      <p:nvGrpSpPr>
+        <p:cNvPr id="1" name=""/>
+        <p:cNvGrpSpPr/>
+        <p:nvPr/>
+      </p:nvGrpSpPr>
+      <p:grpSpPr>
+        <a:xfrm>
+          <a:off x="0" y="0"/>
+          <a:ext cx="0" cy="0"/>
+          <a:chOff x="0" y="0"/>
+          <a:chExt cx="0" cy="0"/>
+        </a:xfrm>
+      </p:grpSpPr>
+      <p:sp>
+        <p:nvSpPr>
+          <p:cNvPr id="2" name="Title 1">
+            <a:extLst>
+              <a:ext uri="{FF2B5EF4-FFF2-40B4-BE49-F238E27FC236}">
+                <a16:creationId xmlns:a16="http://schemas.microsoft.com/office/drawing/2014/main" id="{84E2E6AF-4C46-F611-0830-0584094CF72D}"/>
+              </a:ext>
+            </a:extLst>
+          </p:cNvPr>
+          <p:cNvSpPr>
+            <a:spLocks noGrp="1"/>
+          </p:cNvSpPr>
+          <p:nvPr>
+            <p:ph type="ctrTitle"/>
+          </p:nvPr>
+        </p:nvSpPr>
+        <p:spPr>
+          <a:xfrm>
+            <a:off x="1504670" y="437030"/>
+            <a:ext cx="9234309" cy="498598"/>
+          </a:xfrm>
+        </p:spPr>
+        <p:txBody>
+          <a:bodyPr/>
+          <a:lstStyle/>
+          <a:p>
+            <a:r>
+              <a:rPr lang="en-US" dirty="0"/>
+              <a:t>Expected Obstacles</a:t>
+            </a:r>
+          </a:p>
+        </p:txBody>
+      </p:sp>
+      <p:sp>
+        <p:nvSpPr>
+          <p:cNvPr id="3" name="Subtitle 2">
+            <a:extLst>
+              <a:ext uri="{FF2B5EF4-FFF2-40B4-BE49-F238E27FC236}">
+                <a16:creationId xmlns:a16="http://schemas.microsoft.com/office/drawing/2014/main" id="{471C2136-9DD0-D267-3D8B-A8EE373D98E0}"/>
+              </a:ext>
+            </a:extLst>
+          </p:cNvPr>
+          <p:cNvSpPr>
+            <a:spLocks noGrp="1"/>
+          </p:cNvSpPr>
+          <p:nvPr>
+            <p:ph type="subTitle" idx="1"/>
+          </p:nvPr>
+        </p:nvSpPr>
+        <p:spPr/>
+        <p:txBody>
+          <a:bodyPr/>
+          <a:lstStyle/>
+          <a:p>
+            <a:endParaRPr lang="en-US"/>
+          </a:p>
+        </p:txBody>
+      </p:sp>
+      <p:sp>
+        <p:nvSpPr>
+          <p:cNvPr id="4" name="Text Placeholder 3">
+            <a:extLst>
+              <a:ext uri="{FF2B5EF4-FFF2-40B4-BE49-F238E27FC236}">
+                <a16:creationId xmlns:a16="http://schemas.microsoft.com/office/drawing/2014/main" id="{B44DD88A-56DA-9FD9-78FF-2228D1EE0F97}"/>
+              </a:ext>
+            </a:extLst>
+          </p:cNvPr>
+          <p:cNvSpPr>
+            <a:spLocks noGrp="1"/>
+          </p:cNvSpPr>
+          <p:nvPr>
+            <p:ph type="body" sz="quarter" idx="14"/>
+          </p:nvPr>
+        </p:nvSpPr>
+        <p:spPr/>
+        <p:txBody>
+          <a:bodyPr/>
+          <a:lstStyle/>
+          <a:p>
+            <a:endParaRPr lang="en-US"/>
+          </a:p>
+        </p:txBody>
+      </p:sp>
+      <p:sp>
+        <p:nvSpPr>
+          <p:cNvPr id="5" name="Slide Number Placeholder 4">
+            <a:extLst>
+              <a:ext uri="{FF2B5EF4-FFF2-40B4-BE49-F238E27FC236}">
+                <a16:creationId xmlns:a16="http://schemas.microsoft.com/office/drawing/2014/main" id="{682D4168-ECD1-209B-6680-7551993E2135}"/>
+              </a:ext>
+            </a:extLst>
+          </p:cNvPr>
+          <p:cNvSpPr>
+            <a:spLocks noGrp="1"/>
+          </p:cNvSpPr>
+          <p:nvPr>
+            <p:ph type="sldNum" sz="quarter" idx="12"/>
+          </p:nvPr>
+        </p:nvSpPr>
+        <p:spPr/>
+        <p:txBody>
+          <a:bodyPr/>
+          <a:lstStyle/>
+          <a:p>
+            <a:fld id="{88B5220A-EB23-48F3-9FB6-FE2BFABBF45A}" type="slidenum">
+              <a:rPr lang="en-US" smtClean="0"/>
+              <a:t>19</a:t>
+            </a:fld>
+            <a:endParaRPr lang="en-US" dirty="0"/>
+          </a:p>
+        </p:txBody>
+      </p:sp>
+    </p:spTree>
+    <p:extLst>
+      <p:ext uri="{BB962C8B-B14F-4D97-AF65-F5344CB8AC3E}">
+        <p14:creationId xmlns:p14="http://schemas.microsoft.com/office/powerpoint/2010/main" val="3140182961"/>
       </p:ext>
     </p:extLst>
   </p:cSld>
@@ -7063,6 +7387,151 @@
     <p:extLst>
       <p:ext uri="{BB962C8B-B14F-4D97-AF65-F5344CB8AC3E}">
         <p14:creationId xmlns:p14="http://schemas.microsoft.com/office/powerpoint/2010/main" val="716617530"/>
+      </p:ext>
+    </p:extLst>
+  </p:cSld>
+  <p:clrMapOvr>
+    <a:masterClrMapping/>
+  </p:clrMapOvr>
+</p:sld>
+</file>
+
+<file path=ppt/slides/slide20.xml><?xml version="1.0" encoding="utf-8"?>
+<p:sld xmlns:a="http://schemas.openxmlformats.org/drawingml/2006/main" xmlns:r="http://schemas.openxmlformats.org/officeDocument/2006/relationships" xmlns:p="http://schemas.openxmlformats.org/presentationml/2006/main">
+  <p:cSld>
+    <p:spTree>
+      <p:nvGrpSpPr>
+        <p:cNvPr id="1" name=""/>
+        <p:cNvGrpSpPr/>
+        <p:nvPr/>
+      </p:nvGrpSpPr>
+      <p:grpSpPr>
+        <a:xfrm>
+          <a:off x="0" y="0"/>
+          <a:ext cx="0" cy="0"/>
+          <a:chOff x="0" y="0"/>
+          <a:chExt cx="0" cy="0"/>
+        </a:xfrm>
+      </p:grpSpPr>
+      <p:sp>
+        <p:nvSpPr>
+          <p:cNvPr id="2" name="Title 1">
+            <a:extLst>
+              <a:ext uri="{FF2B5EF4-FFF2-40B4-BE49-F238E27FC236}">
+                <a16:creationId xmlns:a16="http://schemas.microsoft.com/office/drawing/2014/main" id="{6799C4B2-C790-FB8B-4821-10F77E122C20}"/>
+              </a:ext>
+            </a:extLst>
+          </p:cNvPr>
+          <p:cNvSpPr>
+            <a:spLocks noGrp="1"/>
+          </p:cNvSpPr>
+          <p:nvPr>
+            <p:ph type="ctrTitle"/>
+          </p:nvPr>
+        </p:nvSpPr>
+        <p:spPr>
+          <a:xfrm>
+            <a:off x="1504670" y="437030"/>
+            <a:ext cx="9234309" cy="498598"/>
+          </a:xfrm>
+        </p:spPr>
+        <p:txBody>
+          <a:bodyPr/>
+          <a:lstStyle/>
+          <a:p>
+            <a:r>
+              <a:rPr lang="en-US" dirty="0"/>
+              <a:t>Future Plans</a:t>
+            </a:r>
+          </a:p>
+        </p:txBody>
+      </p:sp>
+      <p:sp>
+        <p:nvSpPr>
+          <p:cNvPr id="3" name="Subtitle 2">
+            <a:extLst>
+              <a:ext uri="{FF2B5EF4-FFF2-40B4-BE49-F238E27FC236}">
+                <a16:creationId xmlns:a16="http://schemas.microsoft.com/office/drawing/2014/main" id="{E03FFE2C-5D65-D6E4-2FE1-7A95922722D1}"/>
+              </a:ext>
+            </a:extLst>
+          </p:cNvPr>
+          <p:cNvSpPr>
+            <a:spLocks noGrp="1"/>
+          </p:cNvSpPr>
+          <p:nvPr>
+            <p:ph type="subTitle" idx="1"/>
+          </p:nvPr>
+        </p:nvSpPr>
+        <p:spPr/>
+        <p:txBody>
+          <a:bodyPr/>
+          <a:lstStyle/>
+          <a:p>
+            <a:endParaRPr lang="en-US"/>
+          </a:p>
+        </p:txBody>
+      </p:sp>
+      <p:sp>
+        <p:nvSpPr>
+          <p:cNvPr id="4" name="Text Placeholder 3">
+            <a:extLst>
+              <a:ext uri="{FF2B5EF4-FFF2-40B4-BE49-F238E27FC236}">
+                <a16:creationId xmlns:a16="http://schemas.microsoft.com/office/drawing/2014/main" id="{7794BFF1-E7A0-748B-9321-5A00891D805A}"/>
+              </a:ext>
+            </a:extLst>
+          </p:cNvPr>
+          <p:cNvSpPr>
+            <a:spLocks noGrp="1"/>
+          </p:cNvSpPr>
+          <p:nvPr>
+            <p:ph type="body" sz="quarter" idx="14"/>
+          </p:nvPr>
+        </p:nvSpPr>
+        <p:spPr/>
+        <p:txBody>
+          <a:bodyPr/>
+          <a:lstStyle/>
+          <a:p>
+            <a:r>
+              <a:rPr lang="en-US" dirty="0"/>
+              <a:t>Error correction?</a:t>
+            </a:r>
+          </a:p>
+        </p:txBody>
+      </p:sp>
+      <p:sp>
+        <p:nvSpPr>
+          <p:cNvPr id="5" name="Slide Number Placeholder 4">
+            <a:extLst>
+              <a:ext uri="{FF2B5EF4-FFF2-40B4-BE49-F238E27FC236}">
+                <a16:creationId xmlns:a16="http://schemas.microsoft.com/office/drawing/2014/main" id="{5BDDAFA0-D6CE-5536-5E75-4528A2EC55BD}"/>
+              </a:ext>
+            </a:extLst>
+          </p:cNvPr>
+          <p:cNvSpPr>
+            <a:spLocks noGrp="1"/>
+          </p:cNvSpPr>
+          <p:nvPr>
+            <p:ph type="sldNum" sz="quarter" idx="12"/>
+          </p:nvPr>
+        </p:nvSpPr>
+        <p:spPr/>
+        <p:txBody>
+          <a:bodyPr/>
+          <a:lstStyle/>
+          <a:p>
+            <a:fld id="{88B5220A-EB23-48F3-9FB6-FE2BFABBF45A}" type="slidenum">
+              <a:rPr lang="en-US" smtClean="0"/>
+              <a:t>20</a:t>
+            </a:fld>
+            <a:endParaRPr lang="en-US" dirty="0"/>
+          </a:p>
+        </p:txBody>
+      </p:sp>
+    </p:spTree>
+    <p:extLst>
+      <p:ext uri="{BB962C8B-B14F-4D97-AF65-F5344CB8AC3E}">
+        <p14:creationId xmlns:p14="http://schemas.microsoft.com/office/powerpoint/2010/main" val="391822046"/>
       </p:ext>
     </p:extLst>
   </p:cSld>

</xml_diff>